<commit_message>
added links and tips at end of class 1 ppt
</commit_message>
<xml_diff>
--- a/Class1/Tech314_1.pptx
+++ b/Class1/Tech314_1.pptx
@@ -15,6 +15,7 @@
     <p:sldId id="262" r:id="rId9"/>
     <p:sldId id="261" r:id="rId10"/>
     <p:sldId id="265" r:id="rId11"/>
+    <p:sldId id="266" r:id="rId12"/>
   </p:sldIdLst>
   <p:sldSz cx="12192000" cy="6858000"/>
   <p:notesSz cx="6858000" cy="9144000"/>
@@ -113,6 +114,11 @@
       </a:defRPr>
     </a:lvl9pPr>
   </p:defaultTextStyle>
+  <p:extLst>
+    <p:ext uri="{EFAFB233-063F-42B5-8137-9DF3F51BA10A}">
+      <p15:sldGuideLst xmlns:p15="http://schemas.microsoft.com/office/powerpoint/2012/main"/>
+    </p:ext>
+  </p:extLst>
 </p:presentation>
 </file>
 
@@ -6159,16 +6165,40 @@
           </a:p>
           <a:p>
             <a:r>
-              <a:rPr lang="en-US"/>
+              <a:rPr lang="en-US" dirty="0"/>
               <a:t>React Native: </a:t>
             </a:r>
             <a:r>
-              <a:rPr lang="en-US">
+              <a:rPr lang="en-US" dirty="0">
                 <a:hlinkClick r:id="rId6"/>
               </a:rPr>
               <a:t>https://facebook.github.io/react-native/docs/getting-started.html</a:t>
             </a:r>
-            <a:endParaRPr lang="en-US"/>
+            <a:endParaRPr lang="en-US" dirty="0"/>
+          </a:p>
+          <a:p>
+            <a:r>
+              <a:rPr lang="en-US" dirty="0"/>
+              <a:t>Andrew’s </a:t>
+            </a:r>
+            <a:r>
+              <a:rPr lang="en-US" dirty="0" err="1"/>
+              <a:t>Github</a:t>
+            </a:r>
+            <a:r>
+              <a:rPr lang="en-US" dirty="0"/>
+              <a:t> for Tech 314: </a:t>
+            </a:r>
+            <a:r>
+              <a:rPr lang="en-US" dirty="0">
+                <a:hlinkClick r:id="rId7"/>
+              </a:rPr>
+              <a:t>https://github.com/argentaegis/ReactNativeClass</a:t>
+            </a:r>
+            <a:endParaRPr lang="en-US" dirty="0"/>
+          </a:p>
+          <a:p>
+            <a:endParaRPr lang="en-US" dirty="0"/>
           </a:p>
           <a:p>
             <a:endParaRPr lang="en-US" dirty="0"/>
@@ -6179,6 +6209,144 @@
     <p:extLst>
       <p:ext uri="{BB962C8B-B14F-4D97-AF65-F5344CB8AC3E}">
         <p14:creationId xmlns:p14="http://schemas.microsoft.com/office/powerpoint/2010/main" val="2563011015"/>
+      </p:ext>
+    </p:extLst>
+  </p:cSld>
+  <p:clrMapOvr>
+    <a:masterClrMapping/>
+  </p:clrMapOvr>
+</p:sld>
+</file>
+
+<file path=ppt/slides/slide11.xml><?xml version="1.0" encoding="utf-8"?>
+<p:sld xmlns:a="http://schemas.openxmlformats.org/drawingml/2006/main" xmlns:r="http://schemas.openxmlformats.org/officeDocument/2006/relationships" xmlns:p="http://schemas.openxmlformats.org/presentationml/2006/main">
+  <p:cSld>
+    <p:spTree>
+      <p:nvGrpSpPr>
+        <p:cNvPr id="1" name=""/>
+        <p:cNvGrpSpPr/>
+        <p:nvPr/>
+      </p:nvGrpSpPr>
+      <p:grpSpPr>
+        <a:xfrm>
+          <a:off x="0" y="0"/>
+          <a:ext cx="0" cy="0"/>
+          <a:chOff x="0" y="0"/>
+          <a:chExt cx="0" cy="0"/>
+        </a:xfrm>
+      </p:grpSpPr>
+      <p:sp>
+        <p:nvSpPr>
+          <p:cNvPr id="2" name="Title 1">
+            <a:extLst>
+              <a:ext uri="{FF2B5EF4-FFF2-40B4-BE49-F238E27FC236}">
+                <a16:creationId xmlns:a16="http://schemas.microsoft.com/office/drawing/2014/main" id="{770E92C5-FF34-4892-9D65-1DEE4977B479}"/>
+              </a:ext>
+            </a:extLst>
+          </p:cNvPr>
+          <p:cNvSpPr>
+            <a:spLocks noGrp="1"/>
+          </p:cNvSpPr>
+          <p:nvPr>
+            <p:ph type="title"/>
+          </p:nvPr>
+        </p:nvSpPr>
+        <p:spPr/>
+        <p:txBody>
+          <a:bodyPr/>
+          <a:lstStyle/>
+          <a:p>
+            <a:r>
+              <a:rPr lang="en-US" dirty="0"/>
+              <a:t>Helpful Tips</a:t>
+            </a:r>
+          </a:p>
+        </p:txBody>
+      </p:sp>
+      <p:sp>
+        <p:nvSpPr>
+          <p:cNvPr id="3" name="Content Placeholder 2">
+            <a:extLst>
+              <a:ext uri="{FF2B5EF4-FFF2-40B4-BE49-F238E27FC236}">
+                <a16:creationId xmlns:a16="http://schemas.microsoft.com/office/drawing/2014/main" id="{3196789A-3B65-494D-8AF3-24D63CFC1FC5}"/>
+              </a:ext>
+            </a:extLst>
+          </p:cNvPr>
+          <p:cNvSpPr>
+            <a:spLocks noGrp="1"/>
+          </p:cNvSpPr>
+          <p:nvPr>
+            <p:ph idx="1"/>
+          </p:nvPr>
+        </p:nvSpPr>
+        <p:spPr/>
+        <p:txBody>
+          <a:bodyPr/>
+          <a:lstStyle/>
+          <a:p>
+            <a:r>
+              <a:rPr lang="en-US" dirty="0"/>
+              <a:t>Emulator Dev Menu: ctrl-m</a:t>
+            </a:r>
+          </a:p>
+          <a:p>
+            <a:r>
+              <a:rPr lang="en-US" dirty="0"/>
+              <a:t>Hot Reload</a:t>
+            </a:r>
+          </a:p>
+          <a:p>
+            <a:r>
+              <a:rPr lang="en-US" dirty="0"/>
+              <a:t>“</a:t>
+            </a:r>
+            <a:r>
+              <a:rPr lang="en-US" dirty="0" err="1"/>
+              <a:t>r,r</a:t>
+            </a:r>
+            <a:r>
+              <a:rPr lang="en-US" dirty="0"/>
+              <a:t>” reload</a:t>
+            </a:r>
+          </a:p>
+          <a:p>
+            <a:r>
+              <a:rPr lang="en-US" dirty="0"/>
+              <a:t>After checking out from git, </a:t>
+            </a:r>
+          </a:p>
+          <a:p>
+            <a:pPr lvl="1"/>
+            <a:r>
+              <a:rPr lang="en-US" dirty="0" err="1"/>
+              <a:t>npm</a:t>
+            </a:r>
+            <a:r>
+              <a:rPr lang="en-US" dirty="0"/>
+              <a:t> install</a:t>
+            </a:r>
+          </a:p>
+          <a:p>
+            <a:pPr lvl="1"/>
+            <a:r>
+              <a:rPr lang="en-US" dirty="0"/>
+              <a:t>You may want to react-native upgrade as it’s the simplest way around some of the </a:t>
+            </a:r>
+            <a:r>
+              <a:rPr lang="en-US" dirty="0" err="1"/>
+              <a:t>gradle</a:t>
+            </a:r>
+            <a:r>
+              <a:rPr lang="en-US" dirty="0"/>
+              <a:t> issues.  Use care.</a:t>
+            </a:r>
+          </a:p>
+        </p:txBody>
+      </p:sp>
+    </p:spTree>
+    <p:extLst>
+      <p:ext uri="{BB962C8B-B14F-4D97-AF65-F5344CB8AC3E}">
+        <p14:creationId xmlns:p14="http://schemas.microsoft.com/office/powerpoint/2010/main" val="1632995964"/>
       </p:ext>
     </p:extLst>
   </p:cSld>

</xml_diff>